<commit_message>
added demo slide - final ppt
</commit_message>
<xml_diff>
--- a/NBA Stat Anaylsis.pptx
+++ b/NBA Stat Anaylsis.pptx
@@ -12,8 +12,9 @@
     <p:sldId id="259" r:id="rId6"/>
     <p:sldId id="260" r:id="rId7"/>
     <p:sldId id="262" r:id="rId8"/>
-    <p:sldId id="263" r:id="rId9"/>
-    <p:sldId id="264" r:id="rId10"/>
+    <p:sldId id="265" r:id="rId9"/>
+    <p:sldId id="263" r:id="rId10"/>
+    <p:sldId id="264" r:id="rId11"/>
   </p:sldIdLst>
   <p:sldSz cx="12192000" cy="6858000"/>
   <p:notesSz cx="6858000" cy="9144000"/>
@@ -12059,6 +12060,706 @@
 </p:sld>
 </file>
 
+<file path=ppt/slides/slide10.xml><?xml version="1.0" encoding="utf-8"?>
+<p:sld xmlns:a="http://schemas.openxmlformats.org/drawingml/2006/main" xmlns:r="http://schemas.openxmlformats.org/officeDocument/2006/relationships" xmlns:p="http://schemas.openxmlformats.org/presentationml/2006/main">
+  <p:cSld>
+    <p:bg>
+      <p:bgPr>
+        <a:solidFill>
+          <a:schemeClr val="bg1"/>
+        </a:solidFill>
+        <a:effectLst/>
+      </p:bgPr>
+    </p:bg>
+    <p:spTree>
+      <p:nvGrpSpPr>
+        <p:cNvPr id="1" name=""/>
+        <p:cNvGrpSpPr/>
+        <p:nvPr/>
+      </p:nvGrpSpPr>
+      <p:grpSpPr>
+        <a:xfrm>
+          <a:off x="0" y="0"/>
+          <a:ext cx="0" cy="0"/>
+          <a:chOff x="0" y="0"/>
+          <a:chExt cx="0" cy="0"/>
+        </a:xfrm>
+      </p:grpSpPr>
+      <p:sp>
+        <p:nvSpPr>
+          <p:cNvPr id="8" name="Down Arrow 7">
+            <a:extLst>
+              <a:ext uri="{FF2B5EF4-FFF2-40B4-BE49-F238E27FC236}">
+                <a16:creationId xmlns:a16="http://schemas.microsoft.com/office/drawing/2014/main" id="{B547373F-AF2E-4907-B442-9F902B387FD0}"/>
+              </a:ext>
+              <a:ext uri="{C183D7F6-B498-43B3-948B-1728B52AA6E4}">
+                <adec:decorative xmlns:adec="http://schemas.microsoft.com/office/drawing/2017/decorative" val="1"/>
+              </a:ext>
+            </a:extLst>
+          </p:cNvPr>
+          <p:cNvSpPr>
+            <a:spLocks noGrp="1" noRot="1" noChangeAspect="1" noMove="1" noResize="1" noEditPoints="1" noAdjustHandles="1" noChangeArrowheads="1" noChangeShapeType="1" noTextEdit="1"/>
+          </p:cNvSpPr>
+          <p:nvPr>
+            <p:extLst>
+              <p:ext uri="{386F3935-93C4-4BCD-93E2-E3B085C9AB24}">
+                <p16:designElem xmlns:p16="http://schemas.microsoft.com/office/powerpoint/2015/main" val="1"/>
+              </p:ext>
+            </p:extLst>
+          </p:nvPr>
+        </p:nvSpPr>
+        <p:spPr>
+          <a:xfrm>
+            <a:off x="800100" y="-4763"/>
+            <a:ext cx="3333749" cy="3338514"/>
+          </a:xfrm>
+          <a:prstGeom prst="downArrow">
+            <a:avLst>
+              <a:gd name="adj1" fmla="val 100000"/>
+              <a:gd name="adj2" fmla="val 26890"/>
+            </a:avLst>
+          </a:prstGeom>
+          <a:solidFill>
+            <a:schemeClr val="tx1">
+              <a:lumMod val="85000"/>
+              <a:lumOff val="15000"/>
+            </a:schemeClr>
+          </a:solidFill>
+          <a:ln w="53975">
+            <a:noFill/>
+          </a:ln>
+        </p:spPr>
+        <p:style>
+          <a:lnRef idx="2">
+            <a:schemeClr val="accent1">
+              <a:shade val="50000"/>
+            </a:schemeClr>
+          </a:lnRef>
+          <a:fillRef idx="1">
+            <a:schemeClr val="accent1"/>
+          </a:fillRef>
+          <a:effectRef idx="0">
+            <a:schemeClr val="accent1"/>
+          </a:effectRef>
+          <a:fontRef idx="minor">
+            <a:schemeClr val="lt1"/>
+          </a:fontRef>
+        </p:style>
+        <p:txBody>
+          <a:bodyPr rtlCol="0" anchor="ctr"/>
+          <a:lstStyle/>
+          <a:p>
+            <a:pPr algn="ctr"/>
+            <a:endParaRPr lang="en-US"/>
+          </a:p>
+        </p:txBody>
+      </p:sp>
+      <p:sp>
+        <p:nvSpPr>
+          <p:cNvPr id="2" name="Title 1">
+            <a:extLst>
+              <a:ext uri="{FF2B5EF4-FFF2-40B4-BE49-F238E27FC236}">
+                <a16:creationId xmlns:a16="http://schemas.microsoft.com/office/drawing/2014/main" id="{4F3C0DF8-7C47-439E-BF92-5AF6D08AEA73}"/>
+              </a:ext>
+            </a:extLst>
+          </p:cNvPr>
+          <p:cNvSpPr>
+            <a:spLocks noGrp="1"/>
+          </p:cNvSpPr>
+          <p:nvPr>
+            <p:ph type="title"/>
+          </p:nvPr>
+        </p:nvSpPr>
+        <p:spPr>
+          <a:xfrm>
+            <a:off x="1028700" y="190501"/>
+            <a:ext cx="2886075" cy="2486024"/>
+          </a:xfrm>
+          <a:noFill/>
+        </p:spPr>
+        <p:txBody>
+          <a:bodyPr vert="horz" lIns="91440" tIns="45720" rIns="91440" bIns="45720" rtlCol="0" anchor="ctr">
+            <a:normAutofit/>
+          </a:bodyPr>
+          <a:lstStyle/>
+          <a:p>
+            <a:pPr algn="ctr"/>
+            <a:r>
+              <a:rPr lang="en-US" sz="3600" dirty="0">
+                <a:solidFill>
+                  <a:schemeClr val="bg1"/>
+                </a:solidFill>
+              </a:rPr>
+              <a:t>Accuracy Issue</a:t>
+            </a:r>
+          </a:p>
+        </p:txBody>
+      </p:sp>
+      <p:sp>
+        <p:nvSpPr>
+          <p:cNvPr id="4" name="TextBox 3">
+            <a:extLst>
+              <a:ext uri="{FF2B5EF4-FFF2-40B4-BE49-F238E27FC236}">
+                <a16:creationId xmlns:a16="http://schemas.microsoft.com/office/drawing/2014/main" id="{3C875BF0-C64A-4E4D-826E-CA956A4EDE5D}"/>
+              </a:ext>
+            </a:extLst>
+          </p:cNvPr>
+          <p:cNvSpPr txBox="1"/>
+          <p:nvPr/>
+        </p:nvSpPr>
+        <p:spPr>
+          <a:xfrm>
+            <a:off x="4429125" y="416260"/>
+            <a:ext cx="3333749" cy="369332"/>
+          </a:xfrm>
+          <a:prstGeom prst="rect">
+            <a:avLst/>
+          </a:prstGeom>
+          <a:noFill/>
+        </p:spPr>
+        <p:txBody>
+          <a:bodyPr wrap="square" rtlCol="0">
+            <a:spAutoFit/>
+          </a:bodyPr>
+          <a:lstStyle/>
+          <a:p>
+            <a:r>
+              <a:rPr lang="en-US" dirty="0"/>
+              <a:t>Best Result</a:t>
+            </a:r>
+          </a:p>
+        </p:txBody>
+      </p:sp>
+      <p:sp>
+        <p:nvSpPr>
+          <p:cNvPr id="5" name="TextBox 4">
+            <a:extLst>
+              <a:ext uri="{FF2B5EF4-FFF2-40B4-BE49-F238E27FC236}">
+                <a16:creationId xmlns:a16="http://schemas.microsoft.com/office/drawing/2014/main" id="{B33C6528-B46B-40A6-B1B0-92E4F36CE0CE}"/>
+              </a:ext>
+            </a:extLst>
+          </p:cNvPr>
+          <p:cNvSpPr txBox="1"/>
+          <p:nvPr/>
+        </p:nvSpPr>
+        <p:spPr>
+          <a:xfrm>
+            <a:off x="4429125" y="3528921"/>
+            <a:ext cx="1507787" cy="369332"/>
+          </a:xfrm>
+          <a:prstGeom prst="rect">
+            <a:avLst/>
+          </a:prstGeom>
+          <a:noFill/>
+        </p:spPr>
+        <p:txBody>
+          <a:bodyPr wrap="square" rtlCol="0">
+            <a:spAutoFit/>
+          </a:bodyPr>
+          <a:lstStyle/>
+          <a:p>
+            <a:r>
+              <a:rPr lang="en-US" dirty="0"/>
+              <a:t>Worst Result </a:t>
+            </a:r>
+          </a:p>
+        </p:txBody>
+      </p:sp>
+      <p:pic>
+        <p:nvPicPr>
+          <p:cNvPr id="7" name="Picture 6">
+            <a:extLst>
+              <a:ext uri="{FF2B5EF4-FFF2-40B4-BE49-F238E27FC236}">
+                <a16:creationId xmlns:a16="http://schemas.microsoft.com/office/drawing/2014/main" id="{0BB1CBC6-EC01-4B5D-80BF-00CD749DC126}"/>
+              </a:ext>
+            </a:extLst>
+          </p:cNvPr>
+          <p:cNvPicPr>
+            <a:picLocks noChangeAspect="1"/>
+          </p:cNvPicPr>
+          <p:nvPr/>
+        </p:nvPicPr>
+        <p:blipFill>
+          <a:blip r:embed="rId2">
+            <a:extLst>
+              <a:ext uri="{28A0092B-C50C-407E-A947-70E740481C1C}">
+                <a14:useLocalDpi xmlns:a14="http://schemas.microsoft.com/office/drawing/2010/main" val="0"/>
+              </a:ext>
+            </a:extLst>
+          </a:blip>
+          <a:stretch>
+            <a:fillRect/>
+          </a:stretch>
+        </p:blipFill>
+        <p:spPr>
+          <a:xfrm>
+            <a:off x="7312362" y="289978"/>
+            <a:ext cx="4730480" cy="2652378"/>
+          </a:xfrm>
+          <a:prstGeom prst="rect">
+            <a:avLst/>
+          </a:prstGeom>
+        </p:spPr>
+      </p:pic>
+      <p:pic>
+        <p:nvPicPr>
+          <p:cNvPr id="11" name="Picture 6" descr="Image result for kevin durant headshot">
+            <a:extLst>
+              <a:ext uri="{FF2B5EF4-FFF2-40B4-BE49-F238E27FC236}">
+                <a16:creationId xmlns:a16="http://schemas.microsoft.com/office/drawing/2014/main" id="{95AC18A4-9B1F-406F-8077-878DE73104FB}"/>
+              </a:ext>
+            </a:extLst>
+          </p:cNvPr>
+          <p:cNvPicPr>
+            <a:picLocks noChangeAspect="1" noChangeArrowheads="1"/>
+          </p:cNvPicPr>
+          <p:nvPr/>
+        </p:nvPicPr>
+        <p:blipFill>
+          <a:blip r:embed="rId3">
+            <a:extLst>
+              <a:ext uri="{28A0092B-C50C-407E-A947-70E740481C1C}">
+                <a14:useLocalDpi xmlns:a14="http://schemas.microsoft.com/office/drawing/2010/main" val="0"/>
+              </a:ext>
+            </a:extLst>
+          </a:blip>
+          <a:srcRect/>
+          <a:stretch>
+            <a:fillRect/>
+          </a:stretch>
+        </p:blipFill>
+        <p:spPr bwMode="auto">
+          <a:xfrm>
+            <a:off x="5342106" y="562730"/>
+            <a:ext cx="1777526" cy="2158425"/>
+          </a:xfrm>
+          <a:prstGeom prst="rect">
+            <a:avLst/>
+          </a:prstGeom>
+          <a:noFill/>
+          <a:extLst>
+            <a:ext uri="{909E8E84-426E-40DD-AFC4-6F175D3DCCD1}">
+              <a14:hiddenFill xmlns:a14="http://schemas.microsoft.com/office/drawing/2010/main">
+                <a:solidFill>
+                  <a:srgbClr val="FFFFFF"/>
+                </a:solidFill>
+              </a14:hiddenFill>
+            </a:ext>
+          </a:extLst>
+        </p:spPr>
+      </p:pic>
+      <p:pic>
+        <p:nvPicPr>
+          <p:cNvPr id="14" name="Picture 13">
+            <a:extLst>
+              <a:ext uri="{FF2B5EF4-FFF2-40B4-BE49-F238E27FC236}">
+                <a16:creationId xmlns:a16="http://schemas.microsoft.com/office/drawing/2014/main" id="{4A0CA051-8709-4836-9AB4-BDA2182EA283}"/>
+              </a:ext>
+            </a:extLst>
+          </p:cNvPr>
+          <p:cNvPicPr>
+            <a:picLocks noChangeAspect="1"/>
+          </p:cNvPicPr>
+          <p:nvPr/>
+        </p:nvPicPr>
+        <p:blipFill>
+          <a:blip r:embed="rId4">
+            <a:extLst>
+              <a:ext uri="{28A0092B-C50C-407E-A947-70E740481C1C}">
+                <a14:useLocalDpi xmlns:a14="http://schemas.microsoft.com/office/drawing/2010/main" val="0"/>
+              </a:ext>
+            </a:extLst>
+          </a:blip>
+          <a:stretch>
+            <a:fillRect/>
+          </a:stretch>
+        </p:blipFill>
+        <p:spPr>
+          <a:xfrm>
+            <a:off x="7430610" y="3469480"/>
+            <a:ext cx="4612232" cy="2586077"/>
+          </a:xfrm>
+          <a:prstGeom prst="rect">
+            <a:avLst/>
+          </a:prstGeom>
+        </p:spPr>
+      </p:pic>
+      <p:pic>
+        <p:nvPicPr>
+          <p:cNvPr id="16" name="Picture 15">
+            <a:extLst>
+              <a:ext uri="{FF2B5EF4-FFF2-40B4-BE49-F238E27FC236}">
+                <a16:creationId xmlns:a16="http://schemas.microsoft.com/office/drawing/2014/main" id="{49F5901A-6349-4B6E-84B0-9C73210CCF0D}"/>
+              </a:ext>
+            </a:extLst>
+          </p:cNvPr>
+          <p:cNvPicPr>
+            <a:picLocks noChangeAspect="1"/>
+          </p:cNvPicPr>
+          <p:nvPr/>
+        </p:nvPicPr>
+        <p:blipFill>
+          <a:blip r:embed="rId5">
+            <a:extLst>
+              <a:ext uri="{28A0092B-C50C-407E-A947-70E740481C1C}">
+                <a14:useLocalDpi xmlns:a14="http://schemas.microsoft.com/office/drawing/2010/main" val="0"/>
+              </a:ext>
+            </a:extLst>
+          </a:blip>
+          <a:stretch>
+            <a:fillRect/>
+          </a:stretch>
+        </p:blipFill>
+        <p:spPr>
+          <a:xfrm>
+            <a:off x="5789816" y="2870214"/>
+            <a:ext cx="6408224" cy="276614"/>
+          </a:xfrm>
+          <a:prstGeom prst="rect">
+            <a:avLst/>
+          </a:prstGeom>
+        </p:spPr>
+      </p:pic>
+      <p:sp>
+        <p:nvSpPr>
+          <p:cNvPr id="12" name="Oval 11">
+            <a:extLst>
+              <a:ext uri="{FF2B5EF4-FFF2-40B4-BE49-F238E27FC236}">
+                <a16:creationId xmlns:a16="http://schemas.microsoft.com/office/drawing/2014/main" id="{D465A6AC-AE88-4EA5-9268-8253707136D3}"/>
+              </a:ext>
+            </a:extLst>
+          </p:cNvPr>
+          <p:cNvSpPr/>
+          <p:nvPr/>
+        </p:nvSpPr>
+        <p:spPr>
+          <a:xfrm>
+            <a:off x="7622143" y="2816854"/>
+            <a:ext cx="1202264" cy="503567"/>
+          </a:xfrm>
+          <a:prstGeom prst="ellipse">
+            <a:avLst/>
+          </a:prstGeom>
+          <a:noFill/>
+          <a:ln w="28575">
+            <a:solidFill>
+              <a:srgbClr val="FF0000"/>
+            </a:solidFill>
+          </a:ln>
+        </p:spPr>
+        <p:style>
+          <a:lnRef idx="2">
+            <a:schemeClr val="accent1">
+              <a:shade val="50000"/>
+            </a:schemeClr>
+          </a:lnRef>
+          <a:fillRef idx="1">
+            <a:schemeClr val="accent1"/>
+          </a:fillRef>
+          <a:effectRef idx="0">
+            <a:schemeClr val="accent1"/>
+          </a:effectRef>
+          <a:fontRef idx="minor">
+            <a:schemeClr val="lt1"/>
+          </a:fontRef>
+        </p:style>
+        <p:txBody>
+          <a:bodyPr rtlCol="0" anchor="ctr"/>
+          <a:lstStyle/>
+          <a:p>
+            <a:pPr algn="ctr"/>
+            <a:endParaRPr lang="en-US"/>
+          </a:p>
+        </p:txBody>
+      </p:sp>
+      <p:pic>
+        <p:nvPicPr>
+          <p:cNvPr id="17" name="Picture 2" descr="Image result for steph curry headshot">
+            <a:extLst>
+              <a:ext uri="{FF2B5EF4-FFF2-40B4-BE49-F238E27FC236}">
+                <a16:creationId xmlns:a16="http://schemas.microsoft.com/office/drawing/2014/main" id="{488BD1E6-0B7E-4A52-AC92-3D2BD8E0F6D9}"/>
+              </a:ext>
+            </a:extLst>
+          </p:cNvPr>
+          <p:cNvPicPr>
+            <a:picLocks noChangeAspect="1" noChangeArrowheads="1"/>
+          </p:cNvPicPr>
+          <p:nvPr/>
+        </p:nvPicPr>
+        <p:blipFill>
+          <a:blip r:embed="rId6">
+            <a:extLst>
+              <a:ext uri="{28A0092B-C50C-407E-A947-70E740481C1C}">
+                <a14:useLocalDpi xmlns:a14="http://schemas.microsoft.com/office/drawing/2010/main" val="0"/>
+              </a:ext>
+            </a:extLst>
+          </a:blip>
+          <a:srcRect/>
+          <a:stretch>
+            <a:fillRect/>
+          </a:stretch>
+        </p:blipFill>
+        <p:spPr bwMode="auto">
+          <a:xfrm>
+            <a:off x="5254040" y="3713587"/>
+            <a:ext cx="2176570" cy="2176570"/>
+          </a:xfrm>
+          <a:prstGeom prst="rect">
+            <a:avLst/>
+          </a:prstGeom>
+          <a:noFill/>
+          <a:extLst>
+            <a:ext uri="{909E8E84-426E-40DD-AFC4-6F175D3DCCD1}">
+              <a14:hiddenFill xmlns:a14="http://schemas.microsoft.com/office/drawing/2010/main">
+                <a:solidFill>
+                  <a:srgbClr val="FFFFFF"/>
+                </a:solidFill>
+              </a14:hiddenFill>
+            </a:ext>
+          </a:extLst>
+        </p:spPr>
+      </p:pic>
+      <p:pic>
+        <p:nvPicPr>
+          <p:cNvPr id="19" name="Picture 18">
+            <a:extLst>
+              <a:ext uri="{FF2B5EF4-FFF2-40B4-BE49-F238E27FC236}">
+                <a16:creationId xmlns:a16="http://schemas.microsoft.com/office/drawing/2014/main" id="{3198D0AD-28BA-4AEA-BD45-CF45CBD0570D}"/>
+              </a:ext>
+            </a:extLst>
+          </p:cNvPr>
+          <p:cNvPicPr>
+            <a:picLocks noChangeAspect="1"/>
+          </p:cNvPicPr>
+          <p:nvPr/>
+        </p:nvPicPr>
+        <p:blipFill>
+          <a:blip r:embed="rId7">
+            <a:extLst>
+              <a:ext uri="{28A0092B-C50C-407E-A947-70E740481C1C}">
+                <a14:useLocalDpi xmlns:a14="http://schemas.microsoft.com/office/drawing/2010/main" val="0"/>
+              </a:ext>
+            </a:extLst>
+          </a:blip>
+          <a:stretch>
+            <a:fillRect/>
+          </a:stretch>
+        </p:blipFill>
+        <p:spPr>
+          <a:xfrm>
+            <a:off x="5789816" y="6152581"/>
+            <a:ext cx="6362498" cy="304335"/>
+          </a:xfrm>
+          <a:prstGeom prst="rect">
+            <a:avLst/>
+          </a:prstGeom>
+        </p:spPr>
+      </p:pic>
+      <p:sp>
+        <p:nvSpPr>
+          <p:cNvPr id="20" name="Oval 19">
+            <a:extLst>
+              <a:ext uri="{FF2B5EF4-FFF2-40B4-BE49-F238E27FC236}">
+                <a16:creationId xmlns:a16="http://schemas.microsoft.com/office/drawing/2014/main" id="{0DB7FD76-B13C-49F7-BC99-85045A32B1F0}"/>
+              </a:ext>
+            </a:extLst>
+          </p:cNvPr>
+          <p:cNvSpPr/>
+          <p:nvPr/>
+        </p:nvSpPr>
+        <p:spPr>
+          <a:xfrm>
+            <a:off x="7622143" y="6056024"/>
+            <a:ext cx="1202264" cy="503567"/>
+          </a:xfrm>
+          <a:prstGeom prst="ellipse">
+            <a:avLst/>
+          </a:prstGeom>
+          <a:noFill/>
+          <a:ln w="28575">
+            <a:solidFill>
+              <a:srgbClr val="FF0000"/>
+            </a:solidFill>
+          </a:ln>
+        </p:spPr>
+        <p:style>
+          <a:lnRef idx="2">
+            <a:schemeClr val="accent1">
+              <a:shade val="50000"/>
+            </a:schemeClr>
+          </a:lnRef>
+          <a:fillRef idx="1">
+            <a:schemeClr val="accent1"/>
+          </a:fillRef>
+          <a:effectRef idx="0">
+            <a:schemeClr val="accent1"/>
+          </a:effectRef>
+          <a:fontRef idx="minor">
+            <a:schemeClr val="lt1"/>
+          </a:fontRef>
+        </p:style>
+        <p:txBody>
+          <a:bodyPr rtlCol="0" anchor="ctr"/>
+          <a:lstStyle/>
+          <a:p>
+            <a:pPr algn="ctr"/>
+            <a:endParaRPr lang="en-US"/>
+          </a:p>
+        </p:txBody>
+      </p:sp>
+      <p:sp>
+        <p:nvSpPr>
+          <p:cNvPr id="21" name="TextBox 20">
+            <a:extLst>
+              <a:ext uri="{FF2B5EF4-FFF2-40B4-BE49-F238E27FC236}">
+                <a16:creationId xmlns:a16="http://schemas.microsoft.com/office/drawing/2014/main" id="{3B2AC3C8-C45A-42D1-9A2A-8532198E5BBE}"/>
+              </a:ext>
+            </a:extLst>
+          </p:cNvPr>
+          <p:cNvSpPr txBox="1"/>
+          <p:nvPr/>
+        </p:nvSpPr>
+        <p:spPr>
+          <a:xfrm>
+            <a:off x="807871" y="4212796"/>
+            <a:ext cx="3645577" cy="1200329"/>
+          </a:xfrm>
+          <a:prstGeom prst="rect">
+            <a:avLst/>
+          </a:prstGeom>
+          <a:noFill/>
+        </p:spPr>
+        <p:txBody>
+          <a:bodyPr wrap="square" rtlCol="0">
+            <a:spAutoFit/>
+          </a:bodyPr>
+          <a:lstStyle/>
+          <a:p>
+            <a:r>
+              <a:rPr lang="en-US" dirty="0"/>
+              <a:t>This shows us that neither the drift method nor the naïve method are good predictors of future performance</a:t>
+            </a:r>
+          </a:p>
+        </p:txBody>
+      </p:sp>
+      <p:sp>
+        <p:nvSpPr>
+          <p:cNvPr id="22" name="TextBox 21">
+            <a:extLst>
+              <a:ext uri="{FF2B5EF4-FFF2-40B4-BE49-F238E27FC236}">
+                <a16:creationId xmlns:a16="http://schemas.microsoft.com/office/drawing/2014/main" id="{7D46077F-BC9C-4AE9-8D2A-2724D29A30F2}"/>
+              </a:ext>
+            </a:extLst>
+          </p:cNvPr>
+          <p:cNvSpPr txBox="1"/>
+          <p:nvPr/>
+        </p:nvSpPr>
+        <p:spPr>
+          <a:xfrm>
+            <a:off x="807871" y="5443561"/>
+            <a:ext cx="3499021" cy="646331"/>
+          </a:xfrm>
+          <a:prstGeom prst="rect">
+            <a:avLst/>
+          </a:prstGeom>
+          <a:noFill/>
+        </p:spPr>
+        <p:txBody>
+          <a:bodyPr wrap="square" rtlCol="0">
+            <a:spAutoFit/>
+          </a:bodyPr>
+          <a:lstStyle/>
+          <a:p>
+            <a:r>
+              <a:rPr lang="en-US" dirty="0"/>
+              <a:t>The better results that we got were purely circumstantial  </a:t>
+            </a:r>
+          </a:p>
+        </p:txBody>
+      </p:sp>
+      <p:sp>
+        <p:nvSpPr>
+          <p:cNvPr id="23" name="TextBox 22">
+            <a:extLst>
+              <a:ext uri="{FF2B5EF4-FFF2-40B4-BE49-F238E27FC236}">
+                <a16:creationId xmlns:a16="http://schemas.microsoft.com/office/drawing/2014/main" id="{09F2347D-A633-428B-BE2A-2F48C1F5CAC6}"/>
+              </a:ext>
+            </a:extLst>
+          </p:cNvPr>
+          <p:cNvSpPr txBox="1"/>
+          <p:nvPr/>
+        </p:nvSpPr>
+        <p:spPr>
+          <a:xfrm>
+            <a:off x="807871" y="3536029"/>
+            <a:ext cx="3333749" cy="646331"/>
+          </a:xfrm>
+          <a:prstGeom prst="rect">
+            <a:avLst/>
+          </a:prstGeom>
+          <a:noFill/>
+        </p:spPr>
+        <p:txBody>
+          <a:bodyPr wrap="square" rtlCol="0">
+            <a:spAutoFit/>
+          </a:bodyPr>
+          <a:lstStyle/>
+          <a:p>
+            <a:r>
+              <a:rPr lang="en-US" dirty="0"/>
+              <a:t>RMSE is not less that 10% of the mean of f(x)</a:t>
+            </a:r>
+          </a:p>
+        </p:txBody>
+      </p:sp>
+      <p:sp>
+        <p:nvSpPr>
+          <p:cNvPr id="25" name="TextBox 24">
+            <a:extLst>
+              <a:ext uri="{FF2B5EF4-FFF2-40B4-BE49-F238E27FC236}">
+                <a16:creationId xmlns:a16="http://schemas.microsoft.com/office/drawing/2014/main" id="{4B1CA78A-91DC-4A52-AF44-942BDF08B096}"/>
+              </a:ext>
+            </a:extLst>
+          </p:cNvPr>
+          <p:cNvSpPr txBox="1"/>
+          <p:nvPr/>
+        </p:nvSpPr>
+        <p:spPr>
+          <a:xfrm>
+            <a:off x="381551" y="6165546"/>
+            <a:ext cx="4492101" cy="369332"/>
+          </a:xfrm>
+          <a:prstGeom prst="rect">
+            <a:avLst/>
+          </a:prstGeom>
+          <a:noFill/>
+        </p:spPr>
+        <p:txBody>
+          <a:bodyPr wrap="square" rtlCol="0">
+            <a:spAutoFit/>
+          </a:bodyPr>
+          <a:lstStyle/>
+          <a:p>
+            <a:r>
+              <a:rPr lang="en-US" b="1" dirty="0"/>
+              <a:t>Cannot effectively predict future statistics</a:t>
+            </a:r>
+          </a:p>
+        </p:txBody>
+      </p:sp>
+    </p:spTree>
+    <p:extLst>
+      <p:ext uri="{BB962C8B-B14F-4D97-AF65-F5344CB8AC3E}">
+        <p14:creationId xmlns:p14="http://schemas.microsoft.com/office/powerpoint/2010/main" val="4215656960"/>
+      </p:ext>
+    </p:extLst>
+  </p:cSld>
+  <p:clrMapOvr>
+    <a:masterClrMapping/>
+  </p:clrMapOvr>
+</p:sld>
+</file>
+
 <file path=ppt/slides/slide2.xml><?xml version="1.0" encoding="utf-8"?>
 <p:sld xmlns:a="http://schemas.openxmlformats.org/drawingml/2006/main" xmlns:r="http://schemas.openxmlformats.org/officeDocument/2006/relationships" xmlns:p="http://schemas.openxmlformats.org/presentationml/2006/main">
   <p:cSld>
@@ -14007,6 +14708,217 @@
           <a:chExt cx="0" cy="0"/>
         </a:xfrm>
       </p:grpSpPr>
+      <p:sp>
+        <p:nvSpPr>
+          <p:cNvPr id="16" name="Rectangle 9">
+            <a:extLst>
+              <a:ext uri="{FF2B5EF4-FFF2-40B4-BE49-F238E27FC236}">
+                <a16:creationId xmlns:a16="http://schemas.microsoft.com/office/drawing/2014/main" id="{029DE7B6-DC7C-4BA1-B406-EDDA0C0A31C4}"/>
+              </a:ext>
+              <a:ext uri="{C183D7F6-B498-43B3-948B-1728B52AA6E4}">
+                <adec:decorative xmlns:adec="http://schemas.microsoft.com/office/drawing/2017/decorative" val="1"/>
+              </a:ext>
+            </a:extLst>
+          </p:cNvPr>
+          <p:cNvSpPr>
+            <a:spLocks noGrp="1" noRot="1" noChangeAspect="1" noMove="1" noResize="1" noEditPoints="1" noAdjustHandles="1" noChangeArrowheads="1" noChangeShapeType="1" noTextEdit="1"/>
+          </p:cNvSpPr>
+          <p:nvPr>
+            <p:extLst>
+              <p:ext uri="{386F3935-93C4-4BCD-93E2-E3B085C9AB24}">
+                <p16:designElem xmlns:p16="http://schemas.microsoft.com/office/powerpoint/2015/main" val="1"/>
+              </p:ext>
+            </p:extLst>
+          </p:nvPr>
+        </p:nvSpPr>
+        <p:spPr>
+          <a:xfrm>
+            <a:off x="4654296" y="-2"/>
+            <a:ext cx="7537704" cy="6858002"/>
+          </a:xfrm>
+          <a:prstGeom prst="rect">
+            <a:avLst/>
+          </a:prstGeom>
+          <a:solidFill>
+            <a:schemeClr val="accent1"/>
+          </a:solidFill>
+          <a:ln>
+            <a:noFill/>
+          </a:ln>
+        </p:spPr>
+        <p:style>
+          <a:lnRef idx="2">
+            <a:schemeClr val="accent1">
+              <a:shade val="50000"/>
+            </a:schemeClr>
+          </a:lnRef>
+          <a:fillRef idx="1">
+            <a:schemeClr val="accent1"/>
+          </a:fillRef>
+          <a:effectRef idx="0">
+            <a:schemeClr val="accent1"/>
+          </a:effectRef>
+          <a:fontRef idx="minor">
+            <a:schemeClr val="lt1"/>
+          </a:fontRef>
+        </p:style>
+        <p:txBody>
+          <a:bodyPr rtlCol="0" anchor="ctr"/>
+          <a:lstStyle/>
+          <a:p>
+            <a:pPr marL="0" marR="0" lvl="0" indent="0" algn="ctr" defTabSz="914400" rtl="0" eaLnBrk="1" fontAlgn="auto" latinLnBrk="0" hangingPunct="1">
+              <a:lnSpc>
+                <a:spcPct val="100000"/>
+              </a:lnSpc>
+              <a:spcBef>
+                <a:spcPts val="0"/>
+              </a:spcBef>
+              <a:spcAft>
+                <a:spcPts val="0"/>
+              </a:spcAft>
+              <a:buClrTx/>
+              <a:buSzTx/>
+              <a:buFontTx/>
+              <a:buNone/>
+              <a:tabLst/>
+              <a:defRPr/>
+            </a:pPr>
+            <a:endParaRPr kumimoji="0" lang="en-US" sz="1800" b="0" i="0" u="none" strike="noStrike" kern="1200" cap="none" spc="0" normalizeH="0" baseline="0" noProof="0">
+              <a:ln>
+                <a:noFill/>
+              </a:ln>
+              <a:solidFill>
+                <a:prstClr val="white"/>
+              </a:solidFill>
+              <a:effectLst/>
+              <a:uLnTx/>
+              <a:uFillTx/>
+              <a:latin typeface="Calibri" panose="020F0502020204030204"/>
+              <a:ea typeface="+mn-ea"/>
+              <a:cs typeface="+mn-cs"/>
+            </a:endParaRPr>
+          </a:p>
+        </p:txBody>
+      </p:sp>
+      <p:sp>
+        <p:nvSpPr>
+          <p:cNvPr id="2" name="Title 1">
+            <a:extLst>
+              <a:ext uri="{FF2B5EF4-FFF2-40B4-BE49-F238E27FC236}">
+                <a16:creationId xmlns:a16="http://schemas.microsoft.com/office/drawing/2014/main" id="{1CF341C2-A58F-4977-A61C-A33D708D02F8}"/>
+              </a:ext>
+            </a:extLst>
+          </p:cNvPr>
+          <p:cNvSpPr>
+            <a:spLocks noGrp="1"/>
+          </p:cNvSpPr>
+          <p:nvPr>
+            <p:ph type="title"/>
+          </p:nvPr>
+        </p:nvSpPr>
+        <p:spPr>
+          <a:xfrm>
+            <a:off x="5189620" y="1306071"/>
+            <a:ext cx="5478379" cy="2663407"/>
+          </a:xfrm>
+        </p:spPr>
+        <p:txBody>
+          <a:bodyPr vert="horz" lIns="91440" tIns="45720" rIns="91440" bIns="45720" rtlCol="0" anchor="b">
+            <a:normAutofit/>
+          </a:bodyPr>
+          <a:lstStyle/>
+          <a:p>
+            <a:r>
+              <a:rPr lang="en-US" sz="5400" kern="1200">
+                <a:solidFill>
+                  <a:srgbClr val="FFFFFF"/>
+                </a:solidFill>
+                <a:latin typeface="+mj-lt"/>
+                <a:ea typeface="+mj-ea"/>
+                <a:cs typeface="+mj-cs"/>
+              </a:rPr>
+              <a:t>Demo</a:t>
+            </a:r>
+          </a:p>
+        </p:txBody>
+      </p:sp>
+      <p:pic>
+        <p:nvPicPr>
+          <p:cNvPr id="17" name="Graphic 6" descr="Play">
+            <a:extLst>
+              <a:ext uri="{FF2B5EF4-FFF2-40B4-BE49-F238E27FC236}">
+                <a16:creationId xmlns:a16="http://schemas.microsoft.com/office/drawing/2014/main" id="{F82FF3C2-F984-4594-9B05-C619D3B4BFDA}"/>
+              </a:ext>
+            </a:extLst>
+          </p:cNvPr>
+          <p:cNvPicPr>
+            <a:picLocks noChangeAspect="1"/>
+          </p:cNvPicPr>
+          <p:nvPr/>
+        </p:nvPicPr>
+        <p:blipFill>
+          <a:blip r:embed="rId2">
+            <a:extLst>
+              <a:ext uri="{28A0092B-C50C-407E-A947-70E740481C1C}">
+                <a14:useLocalDpi xmlns:a14="http://schemas.microsoft.com/office/drawing/2010/main" val="0"/>
+              </a:ext>
+              <a:ext uri="{96DAC541-7B7A-43D3-8B79-37D633B846F1}">
+                <asvg:svgBlip xmlns:asvg="http://schemas.microsoft.com/office/drawing/2016/SVG/main" r:embed="rId3"/>
+              </a:ext>
+            </a:extLst>
+          </a:blip>
+          <a:stretch>
+            <a:fillRect/>
+          </a:stretch>
+        </p:blipFill>
+        <p:spPr>
+          <a:xfrm>
+            <a:off x="1481723" y="2593485"/>
+            <a:ext cx="1648572" cy="1648572"/>
+          </a:xfrm>
+          <a:prstGeom prst="rect">
+            <a:avLst/>
+          </a:prstGeom>
+        </p:spPr>
+      </p:pic>
+    </p:spTree>
+    <p:extLst>
+      <p:ext uri="{BB962C8B-B14F-4D97-AF65-F5344CB8AC3E}">
+        <p14:creationId xmlns:p14="http://schemas.microsoft.com/office/powerpoint/2010/main" val="4164196506"/>
+      </p:ext>
+    </p:extLst>
+  </p:cSld>
+  <p:clrMapOvr>
+    <a:masterClrMapping/>
+  </p:clrMapOvr>
+</p:sld>
+</file>
+
+<file path=ppt/slides/slide9.xml><?xml version="1.0" encoding="utf-8"?>
+<p:sld xmlns:a="http://schemas.openxmlformats.org/drawingml/2006/main" xmlns:r="http://schemas.openxmlformats.org/officeDocument/2006/relationships" xmlns:p="http://schemas.openxmlformats.org/presentationml/2006/main">
+  <p:cSld>
+    <p:bg>
+      <p:bgPr>
+        <a:solidFill>
+          <a:schemeClr val="bg1"/>
+        </a:solidFill>
+        <a:effectLst/>
+      </p:bgPr>
+    </p:bg>
+    <p:spTree>
+      <p:nvGrpSpPr>
+        <p:cNvPr id="1" name=""/>
+        <p:cNvGrpSpPr/>
+        <p:nvPr/>
+      </p:nvGrpSpPr>
+      <p:grpSpPr>
+        <a:xfrm>
+          <a:off x="0" y="0"/>
+          <a:ext cx="0" cy="0"/>
+          <a:chOff x="0" y="0"/>
+          <a:chExt cx="0" cy="0"/>
+        </a:xfrm>
+      </p:grpSpPr>
       <p:sp useBgFill="1">
         <p:nvSpPr>
           <p:cNvPr id="8" name="Rectangle 7">
@@ -14698,706 +15610,6 @@
     <p:extLst>
       <p:ext uri="{BB962C8B-B14F-4D97-AF65-F5344CB8AC3E}">
         <p14:creationId xmlns:p14="http://schemas.microsoft.com/office/powerpoint/2010/main" val="3193340094"/>
-      </p:ext>
-    </p:extLst>
-  </p:cSld>
-  <p:clrMapOvr>
-    <a:masterClrMapping/>
-  </p:clrMapOvr>
-</p:sld>
-</file>
-
-<file path=ppt/slides/slide9.xml><?xml version="1.0" encoding="utf-8"?>
-<p:sld xmlns:a="http://schemas.openxmlformats.org/drawingml/2006/main" xmlns:r="http://schemas.openxmlformats.org/officeDocument/2006/relationships" xmlns:p="http://schemas.openxmlformats.org/presentationml/2006/main">
-  <p:cSld>
-    <p:bg>
-      <p:bgPr>
-        <a:solidFill>
-          <a:schemeClr val="bg1"/>
-        </a:solidFill>
-        <a:effectLst/>
-      </p:bgPr>
-    </p:bg>
-    <p:spTree>
-      <p:nvGrpSpPr>
-        <p:cNvPr id="1" name=""/>
-        <p:cNvGrpSpPr/>
-        <p:nvPr/>
-      </p:nvGrpSpPr>
-      <p:grpSpPr>
-        <a:xfrm>
-          <a:off x="0" y="0"/>
-          <a:ext cx="0" cy="0"/>
-          <a:chOff x="0" y="0"/>
-          <a:chExt cx="0" cy="0"/>
-        </a:xfrm>
-      </p:grpSpPr>
-      <p:sp>
-        <p:nvSpPr>
-          <p:cNvPr id="8" name="Down Arrow 7">
-            <a:extLst>
-              <a:ext uri="{FF2B5EF4-FFF2-40B4-BE49-F238E27FC236}">
-                <a16:creationId xmlns:a16="http://schemas.microsoft.com/office/drawing/2014/main" id="{B547373F-AF2E-4907-B442-9F902B387FD0}"/>
-              </a:ext>
-              <a:ext uri="{C183D7F6-B498-43B3-948B-1728B52AA6E4}">
-                <adec:decorative xmlns:adec="http://schemas.microsoft.com/office/drawing/2017/decorative" val="1"/>
-              </a:ext>
-            </a:extLst>
-          </p:cNvPr>
-          <p:cNvSpPr>
-            <a:spLocks noGrp="1" noRot="1" noChangeAspect="1" noMove="1" noResize="1" noEditPoints="1" noAdjustHandles="1" noChangeArrowheads="1" noChangeShapeType="1" noTextEdit="1"/>
-          </p:cNvSpPr>
-          <p:nvPr>
-            <p:extLst>
-              <p:ext uri="{386F3935-93C4-4BCD-93E2-E3B085C9AB24}">
-                <p16:designElem xmlns:p16="http://schemas.microsoft.com/office/powerpoint/2015/main" val="1"/>
-              </p:ext>
-            </p:extLst>
-          </p:nvPr>
-        </p:nvSpPr>
-        <p:spPr>
-          <a:xfrm>
-            <a:off x="800100" y="-4763"/>
-            <a:ext cx="3333749" cy="3338514"/>
-          </a:xfrm>
-          <a:prstGeom prst="downArrow">
-            <a:avLst>
-              <a:gd name="adj1" fmla="val 100000"/>
-              <a:gd name="adj2" fmla="val 26890"/>
-            </a:avLst>
-          </a:prstGeom>
-          <a:solidFill>
-            <a:schemeClr val="tx1">
-              <a:lumMod val="85000"/>
-              <a:lumOff val="15000"/>
-            </a:schemeClr>
-          </a:solidFill>
-          <a:ln w="53975">
-            <a:noFill/>
-          </a:ln>
-        </p:spPr>
-        <p:style>
-          <a:lnRef idx="2">
-            <a:schemeClr val="accent1">
-              <a:shade val="50000"/>
-            </a:schemeClr>
-          </a:lnRef>
-          <a:fillRef idx="1">
-            <a:schemeClr val="accent1"/>
-          </a:fillRef>
-          <a:effectRef idx="0">
-            <a:schemeClr val="accent1"/>
-          </a:effectRef>
-          <a:fontRef idx="minor">
-            <a:schemeClr val="lt1"/>
-          </a:fontRef>
-        </p:style>
-        <p:txBody>
-          <a:bodyPr rtlCol="0" anchor="ctr"/>
-          <a:lstStyle/>
-          <a:p>
-            <a:pPr algn="ctr"/>
-            <a:endParaRPr lang="en-US"/>
-          </a:p>
-        </p:txBody>
-      </p:sp>
-      <p:sp>
-        <p:nvSpPr>
-          <p:cNvPr id="2" name="Title 1">
-            <a:extLst>
-              <a:ext uri="{FF2B5EF4-FFF2-40B4-BE49-F238E27FC236}">
-                <a16:creationId xmlns:a16="http://schemas.microsoft.com/office/drawing/2014/main" id="{4F3C0DF8-7C47-439E-BF92-5AF6D08AEA73}"/>
-              </a:ext>
-            </a:extLst>
-          </p:cNvPr>
-          <p:cNvSpPr>
-            <a:spLocks noGrp="1"/>
-          </p:cNvSpPr>
-          <p:nvPr>
-            <p:ph type="title"/>
-          </p:nvPr>
-        </p:nvSpPr>
-        <p:spPr>
-          <a:xfrm>
-            <a:off x="1028700" y="190501"/>
-            <a:ext cx="2886075" cy="2486024"/>
-          </a:xfrm>
-          <a:noFill/>
-        </p:spPr>
-        <p:txBody>
-          <a:bodyPr vert="horz" lIns="91440" tIns="45720" rIns="91440" bIns="45720" rtlCol="0" anchor="ctr">
-            <a:normAutofit/>
-          </a:bodyPr>
-          <a:lstStyle/>
-          <a:p>
-            <a:pPr algn="ctr"/>
-            <a:r>
-              <a:rPr lang="en-US" sz="3600" dirty="0">
-                <a:solidFill>
-                  <a:schemeClr val="bg1"/>
-                </a:solidFill>
-              </a:rPr>
-              <a:t>Accuracy Issue</a:t>
-            </a:r>
-          </a:p>
-        </p:txBody>
-      </p:sp>
-      <p:sp>
-        <p:nvSpPr>
-          <p:cNvPr id="4" name="TextBox 3">
-            <a:extLst>
-              <a:ext uri="{FF2B5EF4-FFF2-40B4-BE49-F238E27FC236}">
-                <a16:creationId xmlns:a16="http://schemas.microsoft.com/office/drawing/2014/main" id="{3C875BF0-C64A-4E4D-826E-CA956A4EDE5D}"/>
-              </a:ext>
-            </a:extLst>
-          </p:cNvPr>
-          <p:cNvSpPr txBox="1"/>
-          <p:nvPr/>
-        </p:nvSpPr>
-        <p:spPr>
-          <a:xfrm>
-            <a:off x="4429125" y="416260"/>
-            <a:ext cx="3333749" cy="369332"/>
-          </a:xfrm>
-          <a:prstGeom prst="rect">
-            <a:avLst/>
-          </a:prstGeom>
-          <a:noFill/>
-        </p:spPr>
-        <p:txBody>
-          <a:bodyPr wrap="square" rtlCol="0">
-            <a:spAutoFit/>
-          </a:bodyPr>
-          <a:lstStyle/>
-          <a:p>
-            <a:r>
-              <a:rPr lang="en-US" dirty="0"/>
-              <a:t>Best Result</a:t>
-            </a:r>
-          </a:p>
-        </p:txBody>
-      </p:sp>
-      <p:sp>
-        <p:nvSpPr>
-          <p:cNvPr id="5" name="TextBox 4">
-            <a:extLst>
-              <a:ext uri="{FF2B5EF4-FFF2-40B4-BE49-F238E27FC236}">
-                <a16:creationId xmlns:a16="http://schemas.microsoft.com/office/drawing/2014/main" id="{B33C6528-B46B-40A6-B1B0-92E4F36CE0CE}"/>
-              </a:ext>
-            </a:extLst>
-          </p:cNvPr>
-          <p:cNvSpPr txBox="1"/>
-          <p:nvPr/>
-        </p:nvSpPr>
-        <p:spPr>
-          <a:xfrm>
-            <a:off x="4429125" y="3528921"/>
-            <a:ext cx="1507787" cy="369332"/>
-          </a:xfrm>
-          <a:prstGeom prst="rect">
-            <a:avLst/>
-          </a:prstGeom>
-          <a:noFill/>
-        </p:spPr>
-        <p:txBody>
-          <a:bodyPr wrap="square" rtlCol="0">
-            <a:spAutoFit/>
-          </a:bodyPr>
-          <a:lstStyle/>
-          <a:p>
-            <a:r>
-              <a:rPr lang="en-US" dirty="0"/>
-              <a:t>Worst Result </a:t>
-            </a:r>
-          </a:p>
-        </p:txBody>
-      </p:sp>
-      <p:pic>
-        <p:nvPicPr>
-          <p:cNvPr id="7" name="Picture 6">
-            <a:extLst>
-              <a:ext uri="{FF2B5EF4-FFF2-40B4-BE49-F238E27FC236}">
-                <a16:creationId xmlns:a16="http://schemas.microsoft.com/office/drawing/2014/main" id="{0BB1CBC6-EC01-4B5D-80BF-00CD749DC126}"/>
-              </a:ext>
-            </a:extLst>
-          </p:cNvPr>
-          <p:cNvPicPr>
-            <a:picLocks noChangeAspect="1"/>
-          </p:cNvPicPr>
-          <p:nvPr/>
-        </p:nvPicPr>
-        <p:blipFill>
-          <a:blip r:embed="rId2">
-            <a:extLst>
-              <a:ext uri="{28A0092B-C50C-407E-A947-70E740481C1C}">
-                <a14:useLocalDpi xmlns:a14="http://schemas.microsoft.com/office/drawing/2010/main" val="0"/>
-              </a:ext>
-            </a:extLst>
-          </a:blip>
-          <a:stretch>
-            <a:fillRect/>
-          </a:stretch>
-        </p:blipFill>
-        <p:spPr>
-          <a:xfrm>
-            <a:off x="7312362" y="289978"/>
-            <a:ext cx="4730480" cy="2652378"/>
-          </a:xfrm>
-          <a:prstGeom prst="rect">
-            <a:avLst/>
-          </a:prstGeom>
-        </p:spPr>
-      </p:pic>
-      <p:pic>
-        <p:nvPicPr>
-          <p:cNvPr id="11" name="Picture 6" descr="Image result for kevin durant headshot">
-            <a:extLst>
-              <a:ext uri="{FF2B5EF4-FFF2-40B4-BE49-F238E27FC236}">
-                <a16:creationId xmlns:a16="http://schemas.microsoft.com/office/drawing/2014/main" id="{95AC18A4-9B1F-406F-8077-878DE73104FB}"/>
-              </a:ext>
-            </a:extLst>
-          </p:cNvPr>
-          <p:cNvPicPr>
-            <a:picLocks noChangeAspect="1" noChangeArrowheads="1"/>
-          </p:cNvPicPr>
-          <p:nvPr/>
-        </p:nvPicPr>
-        <p:blipFill>
-          <a:blip r:embed="rId3">
-            <a:extLst>
-              <a:ext uri="{28A0092B-C50C-407E-A947-70E740481C1C}">
-                <a14:useLocalDpi xmlns:a14="http://schemas.microsoft.com/office/drawing/2010/main" val="0"/>
-              </a:ext>
-            </a:extLst>
-          </a:blip>
-          <a:srcRect/>
-          <a:stretch>
-            <a:fillRect/>
-          </a:stretch>
-        </p:blipFill>
-        <p:spPr bwMode="auto">
-          <a:xfrm>
-            <a:off x="5342106" y="562730"/>
-            <a:ext cx="1777526" cy="2158425"/>
-          </a:xfrm>
-          <a:prstGeom prst="rect">
-            <a:avLst/>
-          </a:prstGeom>
-          <a:noFill/>
-          <a:extLst>
-            <a:ext uri="{909E8E84-426E-40DD-AFC4-6F175D3DCCD1}">
-              <a14:hiddenFill xmlns:a14="http://schemas.microsoft.com/office/drawing/2010/main">
-                <a:solidFill>
-                  <a:srgbClr val="FFFFFF"/>
-                </a:solidFill>
-              </a14:hiddenFill>
-            </a:ext>
-          </a:extLst>
-        </p:spPr>
-      </p:pic>
-      <p:pic>
-        <p:nvPicPr>
-          <p:cNvPr id="14" name="Picture 13">
-            <a:extLst>
-              <a:ext uri="{FF2B5EF4-FFF2-40B4-BE49-F238E27FC236}">
-                <a16:creationId xmlns:a16="http://schemas.microsoft.com/office/drawing/2014/main" id="{4A0CA051-8709-4836-9AB4-BDA2182EA283}"/>
-              </a:ext>
-            </a:extLst>
-          </p:cNvPr>
-          <p:cNvPicPr>
-            <a:picLocks noChangeAspect="1"/>
-          </p:cNvPicPr>
-          <p:nvPr/>
-        </p:nvPicPr>
-        <p:blipFill>
-          <a:blip r:embed="rId4">
-            <a:extLst>
-              <a:ext uri="{28A0092B-C50C-407E-A947-70E740481C1C}">
-                <a14:useLocalDpi xmlns:a14="http://schemas.microsoft.com/office/drawing/2010/main" val="0"/>
-              </a:ext>
-            </a:extLst>
-          </a:blip>
-          <a:stretch>
-            <a:fillRect/>
-          </a:stretch>
-        </p:blipFill>
-        <p:spPr>
-          <a:xfrm>
-            <a:off x="7430610" y="3469480"/>
-            <a:ext cx="4612232" cy="2586077"/>
-          </a:xfrm>
-          <a:prstGeom prst="rect">
-            <a:avLst/>
-          </a:prstGeom>
-        </p:spPr>
-      </p:pic>
-      <p:pic>
-        <p:nvPicPr>
-          <p:cNvPr id="16" name="Picture 15">
-            <a:extLst>
-              <a:ext uri="{FF2B5EF4-FFF2-40B4-BE49-F238E27FC236}">
-                <a16:creationId xmlns:a16="http://schemas.microsoft.com/office/drawing/2014/main" id="{49F5901A-6349-4B6E-84B0-9C73210CCF0D}"/>
-              </a:ext>
-            </a:extLst>
-          </p:cNvPr>
-          <p:cNvPicPr>
-            <a:picLocks noChangeAspect="1"/>
-          </p:cNvPicPr>
-          <p:nvPr/>
-        </p:nvPicPr>
-        <p:blipFill>
-          <a:blip r:embed="rId5">
-            <a:extLst>
-              <a:ext uri="{28A0092B-C50C-407E-A947-70E740481C1C}">
-                <a14:useLocalDpi xmlns:a14="http://schemas.microsoft.com/office/drawing/2010/main" val="0"/>
-              </a:ext>
-            </a:extLst>
-          </a:blip>
-          <a:stretch>
-            <a:fillRect/>
-          </a:stretch>
-        </p:blipFill>
-        <p:spPr>
-          <a:xfrm>
-            <a:off x="5789816" y="2870214"/>
-            <a:ext cx="6408224" cy="276614"/>
-          </a:xfrm>
-          <a:prstGeom prst="rect">
-            <a:avLst/>
-          </a:prstGeom>
-        </p:spPr>
-      </p:pic>
-      <p:sp>
-        <p:nvSpPr>
-          <p:cNvPr id="12" name="Oval 11">
-            <a:extLst>
-              <a:ext uri="{FF2B5EF4-FFF2-40B4-BE49-F238E27FC236}">
-                <a16:creationId xmlns:a16="http://schemas.microsoft.com/office/drawing/2014/main" id="{D465A6AC-AE88-4EA5-9268-8253707136D3}"/>
-              </a:ext>
-            </a:extLst>
-          </p:cNvPr>
-          <p:cNvSpPr/>
-          <p:nvPr/>
-        </p:nvSpPr>
-        <p:spPr>
-          <a:xfrm>
-            <a:off x="7622143" y="2816854"/>
-            <a:ext cx="1202264" cy="503567"/>
-          </a:xfrm>
-          <a:prstGeom prst="ellipse">
-            <a:avLst/>
-          </a:prstGeom>
-          <a:noFill/>
-          <a:ln w="28575">
-            <a:solidFill>
-              <a:srgbClr val="FF0000"/>
-            </a:solidFill>
-          </a:ln>
-        </p:spPr>
-        <p:style>
-          <a:lnRef idx="2">
-            <a:schemeClr val="accent1">
-              <a:shade val="50000"/>
-            </a:schemeClr>
-          </a:lnRef>
-          <a:fillRef idx="1">
-            <a:schemeClr val="accent1"/>
-          </a:fillRef>
-          <a:effectRef idx="0">
-            <a:schemeClr val="accent1"/>
-          </a:effectRef>
-          <a:fontRef idx="minor">
-            <a:schemeClr val="lt1"/>
-          </a:fontRef>
-        </p:style>
-        <p:txBody>
-          <a:bodyPr rtlCol="0" anchor="ctr"/>
-          <a:lstStyle/>
-          <a:p>
-            <a:pPr algn="ctr"/>
-            <a:endParaRPr lang="en-US"/>
-          </a:p>
-        </p:txBody>
-      </p:sp>
-      <p:pic>
-        <p:nvPicPr>
-          <p:cNvPr id="17" name="Picture 2" descr="Image result for steph curry headshot">
-            <a:extLst>
-              <a:ext uri="{FF2B5EF4-FFF2-40B4-BE49-F238E27FC236}">
-                <a16:creationId xmlns:a16="http://schemas.microsoft.com/office/drawing/2014/main" id="{488BD1E6-0B7E-4A52-AC92-3D2BD8E0F6D9}"/>
-              </a:ext>
-            </a:extLst>
-          </p:cNvPr>
-          <p:cNvPicPr>
-            <a:picLocks noChangeAspect="1" noChangeArrowheads="1"/>
-          </p:cNvPicPr>
-          <p:nvPr/>
-        </p:nvPicPr>
-        <p:blipFill>
-          <a:blip r:embed="rId6">
-            <a:extLst>
-              <a:ext uri="{28A0092B-C50C-407E-A947-70E740481C1C}">
-                <a14:useLocalDpi xmlns:a14="http://schemas.microsoft.com/office/drawing/2010/main" val="0"/>
-              </a:ext>
-            </a:extLst>
-          </a:blip>
-          <a:srcRect/>
-          <a:stretch>
-            <a:fillRect/>
-          </a:stretch>
-        </p:blipFill>
-        <p:spPr bwMode="auto">
-          <a:xfrm>
-            <a:off x="5254040" y="3713587"/>
-            <a:ext cx="2176570" cy="2176570"/>
-          </a:xfrm>
-          <a:prstGeom prst="rect">
-            <a:avLst/>
-          </a:prstGeom>
-          <a:noFill/>
-          <a:extLst>
-            <a:ext uri="{909E8E84-426E-40DD-AFC4-6F175D3DCCD1}">
-              <a14:hiddenFill xmlns:a14="http://schemas.microsoft.com/office/drawing/2010/main">
-                <a:solidFill>
-                  <a:srgbClr val="FFFFFF"/>
-                </a:solidFill>
-              </a14:hiddenFill>
-            </a:ext>
-          </a:extLst>
-        </p:spPr>
-      </p:pic>
-      <p:pic>
-        <p:nvPicPr>
-          <p:cNvPr id="19" name="Picture 18">
-            <a:extLst>
-              <a:ext uri="{FF2B5EF4-FFF2-40B4-BE49-F238E27FC236}">
-                <a16:creationId xmlns:a16="http://schemas.microsoft.com/office/drawing/2014/main" id="{3198D0AD-28BA-4AEA-BD45-CF45CBD0570D}"/>
-              </a:ext>
-            </a:extLst>
-          </p:cNvPr>
-          <p:cNvPicPr>
-            <a:picLocks noChangeAspect="1"/>
-          </p:cNvPicPr>
-          <p:nvPr/>
-        </p:nvPicPr>
-        <p:blipFill>
-          <a:blip r:embed="rId7">
-            <a:extLst>
-              <a:ext uri="{28A0092B-C50C-407E-A947-70E740481C1C}">
-                <a14:useLocalDpi xmlns:a14="http://schemas.microsoft.com/office/drawing/2010/main" val="0"/>
-              </a:ext>
-            </a:extLst>
-          </a:blip>
-          <a:stretch>
-            <a:fillRect/>
-          </a:stretch>
-        </p:blipFill>
-        <p:spPr>
-          <a:xfrm>
-            <a:off x="5789816" y="6152581"/>
-            <a:ext cx="6362498" cy="304335"/>
-          </a:xfrm>
-          <a:prstGeom prst="rect">
-            <a:avLst/>
-          </a:prstGeom>
-        </p:spPr>
-      </p:pic>
-      <p:sp>
-        <p:nvSpPr>
-          <p:cNvPr id="20" name="Oval 19">
-            <a:extLst>
-              <a:ext uri="{FF2B5EF4-FFF2-40B4-BE49-F238E27FC236}">
-                <a16:creationId xmlns:a16="http://schemas.microsoft.com/office/drawing/2014/main" id="{0DB7FD76-B13C-49F7-BC99-85045A32B1F0}"/>
-              </a:ext>
-            </a:extLst>
-          </p:cNvPr>
-          <p:cNvSpPr/>
-          <p:nvPr/>
-        </p:nvSpPr>
-        <p:spPr>
-          <a:xfrm>
-            <a:off x="7622143" y="6056024"/>
-            <a:ext cx="1202264" cy="503567"/>
-          </a:xfrm>
-          <a:prstGeom prst="ellipse">
-            <a:avLst/>
-          </a:prstGeom>
-          <a:noFill/>
-          <a:ln w="28575">
-            <a:solidFill>
-              <a:srgbClr val="FF0000"/>
-            </a:solidFill>
-          </a:ln>
-        </p:spPr>
-        <p:style>
-          <a:lnRef idx="2">
-            <a:schemeClr val="accent1">
-              <a:shade val="50000"/>
-            </a:schemeClr>
-          </a:lnRef>
-          <a:fillRef idx="1">
-            <a:schemeClr val="accent1"/>
-          </a:fillRef>
-          <a:effectRef idx="0">
-            <a:schemeClr val="accent1"/>
-          </a:effectRef>
-          <a:fontRef idx="minor">
-            <a:schemeClr val="lt1"/>
-          </a:fontRef>
-        </p:style>
-        <p:txBody>
-          <a:bodyPr rtlCol="0" anchor="ctr"/>
-          <a:lstStyle/>
-          <a:p>
-            <a:pPr algn="ctr"/>
-            <a:endParaRPr lang="en-US"/>
-          </a:p>
-        </p:txBody>
-      </p:sp>
-      <p:sp>
-        <p:nvSpPr>
-          <p:cNvPr id="21" name="TextBox 20">
-            <a:extLst>
-              <a:ext uri="{FF2B5EF4-FFF2-40B4-BE49-F238E27FC236}">
-                <a16:creationId xmlns:a16="http://schemas.microsoft.com/office/drawing/2014/main" id="{3B2AC3C8-C45A-42D1-9A2A-8532198E5BBE}"/>
-              </a:ext>
-            </a:extLst>
-          </p:cNvPr>
-          <p:cNvSpPr txBox="1"/>
-          <p:nvPr/>
-        </p:nvSpPr>
-        <p:spPr>
-          <a:xfrm>
-            <a:off x="807871" y="4212796"/>
-            <a:ext cx="3645577" cy="1200329"/>
-          </a:xfrm>
-          <a:prstGeom prst="rect">
-            <a:avLst/>
-          </a:prstGeom>
-          <a:noFill/>
-        </p:spPr>
-        <p:txBody>
-          <a:bodyPr wrap="square" rtlCol="0">
-            <a:spAutoFit/>
-          </a:bodyPr>
-          <a:lstStyle/>
-          <a:p>
-            <a:r>
-              <a:rPr lang="en-US" dirty="0"/>
-              <a:t>This shows us that neither the drift method nor the naïve method are good predictors of future performance</a:t>
-            </a:r>
-          </a:p>
-        </p:txBody>
-      </p:sp>
-      <p:sp>
-        <p:nvSpPr>
-          <p:cNvPr id="22" name="TextBox 21">
-            <a:extLst>
-              <a:ext uri="{FF2B5EF4-FFF2-40B4-BE49-F238E27FC236}">
-                <a16:creationId xmlns:a16="http://schemas.microsoft.com/office/drawing/2014/main" id="{7D46077F-BC9C-4AE9-8D2A-2724D29A30F2}"/>
-              </a:ext>
-            </a:extLst>
-          </p:cNvPr>
-          <p:cNvSpPr txBox="1"/>
-          <p:nvPr/>
-        </p:nvSpPr>
-        <p:spPr>
-          <a:xfrm>
-            <a:off x="807871" y="5443561"/>
-            <a:ext cx="3499021" cy="646331"/>
-          </a:xfrm>
-          <a:prstGeom prst="rect">
-            <a:avLst/>
-          </a:prstGeom>
-          <a:noFill/>
-        </p:spPr>
-        <p:txBody>
-          <a:bodyPr wrap="square" rtlCol="0">
-            <a:spAutoFit/>
-          </a:bodyPr>
-          <a:lstStyle/>
-          <a:p>
-            <a:r>
-              <a:rPr lang="en-US" dirty="0"/>
-              <a:t>The better results that we got were purely circumstantial  </a:t>
-            </a:r>
-          </a:p>
-        </p:txBody>
-      </p:sp>
-      <p:sp>
-        <p:nvSpPr>
-          <p:cNvPr id="23" name="TextBox 22">
-            <a:extLst>
-              <a:ext uri="{FF2B5EF4-FFF2-40B4-BE49-F238E27FC236}">
-                <a16:creationId xmlns:a16="http://schemas.microsoft.com/office/drawing/2014/main" id="{09F2347D-A633-428B-BE2A-2F48C1F5CAC6}"/>
-              </a:ext>
-            </a:extLst>
-          </p:cNvPr>
-          <p:cNvSpPr txBox="1"/>
-          <p:nvPr/>
-        </p:nvSpPr>
-        <p:spPr>
-          <a:xfrm>
-            <a:off x="807871" y="3536029"/>
-            <a:ext cx="3333749" cy="646331"/>
-          </a:xfrm>
-          <a:prstGeom prst="rect">
-            <a:avLst/>
-          </a:prstGeom>
-          <a:noFill/>
-        </p:spPr>
-        <p:txBody>
-          <a:bodyPr wrap="square" rtlCol="0">
-            <a:spAutoFit/>
-          </a:bodyPr>
-          <a:lstStyle/>
-          <a:p>
-            <a:r>
-              <a:rPr lang="en-US" dirty="0"/>
-              <a:t>RMSE is not less that 10% of the mean of f(x)</a:t>
-            </a:r>
-          </a:p>
-        </p:txBody>
-      </p:sp>
-      <p:sp>
-        <p:nvSpPr>
-          <p:cNvPr id="25" name="TextBox 24">
-            <a:extLst>
-              <a:ext uri="{FF2B5EF4-FFF2-40B4-BE49-F238E27FC236}">
-                <a16:creationId xmlns:a16="http://schemas.microsoft.com/office/drawing/2014/main" id="{4B1CA78A-91DC-4A52-AF44-942BDF08B096}"/>
-              </a:ext>
-            </a:extLst>
-          </p:cNvPr>
-          <p:cNvSpPr txBox="1"/>
-          <p:nvPr/>
-        </p:nvSpPr>
-        <p:spPr>
-          <a:xfrm>
-            <a:off x="381551" y="6165546"/>
-            <a:ext cx="4492101" cy="369332"/>
-          </a:xfrm>
-          <a:prstGeom prst="rect">
-            <a:avLst/>
-          </a:prstGeom>
-          <a:noFill/>
-        </p:spPr>
-        <p:txBody>
-          <a:bodyPr wrap="square" rtlCol="0">
-            <a:spAutoFit/>
-          </a:bodyPr>
-          <a:lstStyle/>
-          <a:p>
-            <a:r>
-              <a:rPr lang="en-US" b="1" dirty="0"/>
-              <a:t>Cannot effectively predict future statistics</a:t>
-            </a:r>
-          </a:p>
-        </p:txBody>
-      </p:sp>
-    </p:spTree>
-    <p:extLst>
-      <p:ext uri="{BB962C8B-B14F-4D97-AF65-F5344CB8AC3E}">
-        <p14:creationId xmlns:p14="http://schemas.microsoft.com/office/powerpoint/2010/main" val="4215656960"/>
       </p:ext>
     </p:extLst>
   </p:cSld>

</xml_diff>